<commit_message>
Added slides up to Week 8.
</commit_message>
<xml_diff>
--- a/docs/slides/Unit4_Types.pptx
+++ b/docs/slides/Unit4_Types.pptx
@@ -655,7 +655,7 @@
               <a:pPr>
                 <a:defRPr/>
               </a:pPr>
-              <a:t>1/18/2021</a:t>
+              <a:t>1/20/2021</a:t>
             </a:fld>
             <a:endParaRPr lang="en-US"/>
           </a:p>
@@ -7369,15 +7369,7 @@
             </a:pPr>
             <a:r>
               <a:rPr lang="en-US" sz="2400" dirty="0" smtClean="0"/>
-              <a:t>32 </a:t>
-            </a:r>
-            <a:r>
-              <a:rPr lang="en-US" sz="2400" dirty="0" smtClean="0"/>
-              <a:t>bits (4 </a:t>
-            </a:r>
-            <a:r>
-              <a:rPr lang="en-US" sz="2400" dirty="0" smtClean="0"/>
-              <a:t>bytes): Unicode characters (e.g. letters, emoticons, Mahjong tiles)</a:t>
+              <a:t>32 bits (4 bytes): Unicode characters (e.g. letters, emoticons, Mahjong tiles)</a:t>
             </a:r>
             <a:endParaRPr lang="en-US" sz="2000" dirty="0"/>
           </a:p>
@@ -8035,8 +8027,12 @@
               <a:buChar char="n"/>
             </a:pPr>
             <a:r>
+              <a:rPr lang="en-US" sz="2400" smtClean="0"/>
+              <a:t>Interpret </a:t>
+            </a:r>
+            <a:r>
               <a:rPr lang="en-US" sz="2400" dirty="0" smtClean="0"/>
-              <a:t>Interpreter the value accordingly</a:t>
+              <a:t>the value accordingly</a:t>
             </a:r>
             <a:endParaRPr lang="en-US" sz="2400" dirty="0"/>
           </a:p>

</xml_diff>